<commit_message>
Organização na exibição dos dados na console
</commit_message>
<xml_diff>
--- a/docs/lld.pptx
+++ b/docs/lld.pptx
@@ -6,6 +6,7 @@
   </p:sldMasterIdLst>
   <p:sldIdLst>
     <p:sldId id="256" r:id="rId2"/>
+    <p:sldId id="258" r:id="rId3"/>
   </p:sldIdLst>
   <p:sldSz cx="12192000" cy="6858000"/>
   <p:notesSz cx="6858000" cy="9144000"/>
@@ -576,7 +577,7 @@
           <a:p>
             <a:fld id="{A6C37289-FA9E-4237-99F4-11BAAD240069}" type="datetimeFigureOut">
               <a:rPr lang="pt-BR" smtClean="0"/>
-              <a:t>20/10/2020</a:t>
+              <a:t>24/10/2020</a:t>
             </a:fld>
             <a:endParaRPr lang="pt-BR"/>
           </a:p>
@@ -774,7 +775,7 @@
           <a:p>
             <a:fld id="{A6C37289-FA9E-4237-99F4-11BAAD240069}" type="datetimeFigureOut">
               <a:rPr lang="pt-BR" smtClean="0"/>
-              <a:t>20/10/2020</a:t>
+              <a:t>24/10/2020</a:t>
             </a:fld>
             <a:endParaRPr lang="pt-BR"/>
           </a:p>
@@ -982,7 +983,7 @@
           <a:p>
             <a:fld id="{A6C37289-FA9E-4237-99F4-11BAAD240069}" type="datetimeFigureOut">
               <a:rPr lang="pt-BR" smtClean="0"/>
-              <a:t>20/10/2020</a:t>
+              <a:t>24/10/2020</a:t>
             </a:fld>
             <a:endParaRPr lang="pt-BR"/>
           </a:p>
@@ -1180,7 +1181,7 @@
           <a:p>
             <a:fld id="{A6C37289-FA9E-4237-99F4-11BAAD240069}" type="datetimeFigureOut">
               <a:rPr lang="pt-BR" smtClean="0"/>
-              <a:t>20/10/2020</a:t>
+              <a:t>24/10/2020</a:t>
             </a:fld>
             <a:endParaRPr lang="pt-BR"/>
           </a:p>
@@ -1455,7 +1456,7 @@
           <a:p>
             <a:fld id="{A6C37289-FA9E-4237-99F4-11BAAD240069}" type="datetimeFigureOut">
               <a:rPr lang="pt-BR" smtClean="0"/>
-              <a:t>20/10/2020</a:t>
+              <a:t>24/10/2020</a:t>
             </a:fld>
             <a:endParaRPr lang="pt-BR"/>
           </a:p>
@@ -1720,7 +1721,7 @@
           <a:p>
             <a:fld id="{A6C37289-FA9E-4237-99F4-11BAAD240069}" type="datetimeFigureOut">
               <a:rPr lang="pt-BR" smtClean="0"/>
-              <a:t>20/10/2020</a:t>
+              <a:t>24/10/2020</a:t>
             </a:fld>
             <a:endParaRPr lang="pt-BR"/>
           </a:p>
@@ -2132,7 +2133,7 @@
           <a:p>
             <a:fld id="{A6C37289-FA9E-4237-99F4-11BAAD240069}" type="datetimeFigureOut">
               <a:rPr lang="pt-BR" smtClean="0"/>
-              <a:t>20/10/2020</a:t>
+              <a:t>24/10/2020</a:t>
             </a:fld>
             <a:endParaRPr lang="pt-BR"/>
           </a:p>
@@ -2273,7 +2274,7 @@
           <a:p>
             <a:fld id="{A6C37289-FA9E-4237-99F4-11BAAD240069}" type="datetimeFigureOut">
               <a:rPr lang="pt-BR" smtClean="0"/>
-              <a:t>20/10/2020</a:t>
+              <a:t>24/10/2020</a:t>
             </a:fld>
             <a:endParaRPr lang="pt-BR"/>
           </a:p>
@@ -2386,7 +2387,7 @@
           <a:p>
             <a:fld id="{A6C37289-FA9E-4237-99F4-11BAAD240069}" type="datetimeFigureOut">
               <a:rPr lang="pt-BR" smtClean="0"/>
-              <a:t>20/10/2020</a:t>
+              <a:t>24/10/2020</a:t>
             </a:fld>
             <a:endParaRPr lang="pt-BR"/>
           </a:p>
@@ -2697,7 +2698,7 @@
           <a:p>
             <a:fld id="{A6C37289-FA9E-4237-99F4-11BAAD240069}" type="datetimeFigureOut">
               <a:rPr lang="pt-BR" smtClean="0"/>
-              <a:t>20/10/2020</a:t>
+              <a:t>24/10/2020</a:t>
             </a:fld>
             <a:endParaRPr lang="pt-BR"/>
           </a:p>
@@ -2985,7 +2986,7 @@
           <a:p>
             <a:fld id="{A6C37289-FA9E-4237-99F4-11BAAD240069}" type="datetimeFigureOut">
               <a:rPr lang="pt-BR" smtClean="0"/>
-              <a:t>20/10/2020</a:t>
+              <a:t>24/10/2020</a:t>
             </a:fld>
             <a:endParaRPr lang="pt-BR"/>
           </a:p>
@@ -3226,7 +3227,7 @@
           <a:p>
             <a:fld id="{A6C37289-FA9E-4237-99F4-11BAAD240069}" type="datetimeFigureOut">
               <a:rPr lang="pt-BR" smtClean="0"/>
-              <a:t>20/10/2020</a:t>
+              <a:t>24/10/2020</a:t>
             </a:fld>
             <a:endParaRPr lang="pt-BR"/>
           </a:p>
@@ -3706,7 +3707,7 @@
         </p:nvSpPr>
         <p:spPr>
           <a:xfrm>
-            <a:off x="2117264" y="602845"/>
+            <a:off x="2117264" y="600906"/>
             <a:ext cx="1736035" cy="371061"/>
           </a:xfrm>
           <a:prstGeom prst="rect">
@@ -3791,7 +3792,7 @@
         </p:blipFill>
         <p:spPr>
           <a:xfrm>
-            <a:off x="2294142" y="1289936"/>
+            <a:off x="2298579" y="1289936"/>
             <a:ext cx="1382281" cy="1382281"/>
           </a:xfrm>
           <a:prstGeom prst="rect">
@@ -3813,7 +3814,7 @@
         </p:nvSpPr>
         <p:spPr>
           <a:xfrm>
-            <a:off x="3049661" y="4026148"/>
+            <a:off x="1195530" y="3974583"/>
             <a:ext cx="3220278" cy="1987826"/>
           </a:xfrm>
           <a:prstGeom prst="rect">
@@ -4019,53 +4020,6 @@
           </a:p>
         </p:txBody>
       </p:sp>
-      <p:pic>
-        <p:nvPicPr>
-          <p:cNvPr id="30" name="Picture 6" descr="ícone sinal de wifi, router, ponto de acesso">
-            <a:extLst>
-              <a:ext uri="{FF2B5EF4-FFF2-40B4-BE49-F238E27FC236}">
-                <a16:creationId xmlns:a16="http://schemas.microsoft.com/office/drawing/2014/main" id="{9DB2ED25-398C-418A-919F-AC3FB90A5866}"/>
-              </a:ext>
-            </a:extLst>
-          </p:cNvPr>
-          <p:cNvPicPr>
-            <a:picLocks noChangeAspect="1" noChangeArrowheads="1"/>
-          </p:cNvPicPr>
-          <p:nvPr/>
-        </p:nvPicPr>
-        <p:blipFill>
-          <a:blip r:embed="rId5" cstate="print">
-            <a:extLst>
-              <a:ext uri="{28A0092B-C50C-407E-A947-70E740481C1C}">
-                <a14:useLocalDpi xmlns:a14="http://schemas.microsoft.com/office/drawing/2010/main" val="0"/>
-              </a:ext>
-            </a:extLst>
-          </a:blip>
-          <a:srcRect/>
-          <a:stretch>
-            <a:fillRect/>
-          </a:stretch>
-        </p:blipFill>
-        <p:spPr bwMode="auto">
-          <a:xfrm>
-            <a:off x="2158159" y="3460746"/>
-            <a:ext cx="716022" cy="716022"/>
-          </a:xfrm>
-          <a:prstGeom prst="rect">
-            <a:avLst/>
-          </a:prstGeom>
-          <a:noFill/>
-          <a:extLst>
-            <a:ext uri="{909E8E84-426E-40DD-AFC4-6F175D3DCCD1}">
-              <a14:hiddenFill xmlns:a14="http://schemas.microsoft.com/office/drawing/2010/main">
-                <a:solidFill>
-                  <a:srgbClr val="FFFFFF"/>
-                </a:solidFill>
-              </a14:hiddenFill>
-            </a:ext>
-          </a:extLst>
-        </p:spPr>
-      </p:pic>
       <p:sp>
         <p:nvSpPr>
           <p:cNvPr id="35" name="CaixaDeTexto 34">
@@ -4080,7 +4034,7 @@
         </p:nvSpPr>
         <p:spPr>
           <a:xfrm>
-            <a:off x="4184376" y="4143367"/>
+            <a:off x="2330245" y="4091802"/>
             <a:ext cx="950847" cy="369332"/>
           </a:xfrm>
           <a:prstGeom prst="rect">
@@ -4116,7 +4070,7 @@
           <p:nvPr/>
         </p:nvPicPr>
         <p:blipFill>
-          <a:blip r:embed="rId6">
+          <a:blip r:embed="rId5">
             <a:extLst>
               <a:ext uri="{28A0092B-C50C-407E-A947-70E740481C1C}">
                 <a14:useLocalDpi xmlns:a14="http://schemas.microsoft.com/office/drawing/2010/main" val="0"/>
@@ -4129,7 +4083,7 @@
         </p:blipFill>
         <p:spPr>
           <a:xfrm>
-            <a:off x="3213937" y="4597127"/>
+            <a:off x="1359806" y="4545562"/>
             <a:ext cx="1248157" cy="1248157"/>
           </a:xfrm>
           <a:prstGeom prst="rect">
@@ -4180,53 +4134,6 @@
       </p:cxnSp>
       <p:pic>
         <p:nvPicPr>
-          <p:cNvPr id="42" name="Picture 6" descr="ícone sinal de wifi, router, ponto de acesso">
-            <a:extLst>
-              <a:ext uri="{FF2B5EF4-FFF2-40B4-BE49-F238E27FC236}">
-                <a16:creationId xmlns:a16="http://schemas.microsoft.com/office/drawing/2014/main" id="{630E596A-3A55-42E2-855D-7FAF344AAE0B}"/>
-              </a:ext>
-            </a:extLst>
-          </p:cNvPr>
-          <p:cNvPicPr>
-            <a:picLocks noChangeAspect="1" noChangeArrowheads="1"/>
-          </p:cNvPicPr>
-          <p:nvPr/>
-        </p:nvPicPr>
-        <p:blipFill>
-          <a:blip r:embed="rId5" cstate="print">
-            <a:extLst>
-              <a:ext uri="{28A0092B-C50C-407E-A947-70E740481C1C}">
-                <a14:useLocalDpi xmlns:a14="http://schemas.microsoft.com/office/drawing/2010/main" val="0"/>
-              </a:ext>
-            </a:extLst>
-          </a:blip>
-          <a:srcRect/>
-          <a:stretch>
-            <a:fillRect/>
-          </a:stretch>
-        </p:blipFill>
-        <p:spPr bwMode="auto">
-          <a:xfrm>
-            <a:off x="5979675" y="730311"/>
-            <a:ext cx="716022" cy="716022"/>
-          </a:xfrm>
-          <a:prstGeom prst="rect">
-            <a:avLst/>
-          </a:prstGeom>
-          <a:noFill/>
-          <a:extLst>
-            <a:ext uri="{909E8E84-426E-40DD-AFC4-6F175D3DCCD1}">
-              <a14:hiddenFill xmlns:a14="http://schemas.microsoft.com/office/drawing/2010/main">
-                <a:solidFill>
-                  <a:srgbClr val="FFFFFF"/>
-                </a:solidFill>
-              </a14:hiddenFill>
-            </a:ext>
-          </a:extLst>
-        </p:spPr>
-      </p:pic>
-      <p:pic>
-        <p:nvPicPr>
           <p:cNvPr id="44" name="Imagem 43" descr="Logotipo&#10;&#10;Descrição gerada automaticamente">
             <a:extLst>
               <a:ext uri="{FF2B5EF4-FFF2-40B4-BE49-F238E27FC236}">
@@ -4240,7 +4147,7 @@
           <p:nvPr/>
         </p:nvPicPr>
         <p:blipFill>
-          <a:blip r:embed="rId7">
+          <a:blip r:embed="rId6">
             <a:extLst>
               <a:ext uri="{28A0092B-C50C-407E-A947-70E740481C1C}">
                 <a14:useLocalDpi xmlns:a14="http://schemas.microsoft.com/office/drawing/2010/main" val="0"/>
@@ -4253,7 +4160,7 @@
         </p:blipFill>
         <p:spPr>
           <a:xfrm>
-            <a:off x="4630376" y="4328033"/>
+            <a:off x="2776245" y="4276468"/>
             <a:ext cx="1471281" cy="1471281"/>
           </a:xfrm>
           <a:prstGeom prst="rect">
@@ -4276,7 +4183,7 @@
           <p:nvPr/>
         </p:nvPicPr>
         <p:blipFill>
-          <a:blip r:embed="rId8">
+          <a:blip r:embed="rId7">
             <a:extLst>
               <a:ext uri="{28A0092B-C50C-407E-A947-70E740481C1C}">
                 <a14:useLocalDpi xmlns:a14="http://schemas.microsoft.com/office/drawing/2010/main" val="0"/>
@@ -4312,7 +4219,7 @@
           <p:nvPr/>
         </p:nvPicPr>
         <p:blipFill>
-          <a:blip r:embed="rId9">
+          <a:blip r:embed="rId8">
             <a:extLst>
               <a:ext uri="{28A0092B-C50C-407E-A947-70E740481C1C}">
                 <a14:useLocalDpi xmlns:a14="http://schemas.microsoft.com/office/drawing/2010/main" val="0"/>
@@ -4348,7 +4255,7 @@
           <p:nvPr/>
         </p:nvPicPr>
         <p:blipFill>
-          <a:blip r:embed="rId10">
+          <a:blip r:embed="rId9">
             <a:extLst>
               <a:ext uri="{28A0092B-C50C-407E-A947-70E740481C1C}">
                 <a14:useLocalDpi xmlns:a14="http://schemas.microsoft.com/office/drawing/2010/main" val="0"/>
@@ -4384,7 +4291,7 @@
           <p:nvPr/>
         </p:nvPicPr>
         <p:blipFill>
-          <a:blip r:embed="rId7">
+          <a:blip r:embed="rId6">
             <a:extLst>
               <a:ext uri="{28A0092B-C50C-407E-A947-70E740481C1C}">
                 <a14:useLocalDpi xmlns:a14="http://schemas.microsoft.com/office/drawing/2010/main" val="0"/>
@@ -4421,7 +4328,7 @@
         </p:nvCxnSpPr>
         <p:spPr>
           <a:xfrm>
-            <a:off x="3947285" y="1771094"/>
+            <a:off x="3947286" y="1766616"/>
             <a:ext cx="2852852" cy="1144"/>
           </a:xfrm>
           <a:prstGeom prst="straightConnector1">
@@ -4448,53 +4355,6 @@
       </p:cxnSp>
       <p:pic>
         <p:nvPicPr>
-          <p:cNvPr id="49" name="Picture 6" descr="ícone sinal de wifi, router, ponto de acesso">
-            <a:extLst>
-              <a:ext uri="{FF2B5EF4-FFF2-40B4-BE49-F238E27FC236}">
-                <a16:creationId xmlns:a16="http://schemas.microsoft.com/office/drawing/2014/main" id="{56FBF8EC-AC5E-4DAB-9D6D-B2956B5BC0CB}"/>
-              </a:ext>
-            </a:extLst>
-          </p:cNvPr>
-          <p:cNvPicPr>
-            <a:picLocks noChangeAspect="1" noChangeArrowheads="1"/>
-          </p:cNvPicPr>
-          <p:nvPr/>
-        </p:nvPicPr>
-        <p:blipFill>
-          <a:blip r:embed="rId5" cstate="print">
-            <a:extLst>
-              <a:ext uri="{28A0092B-C50C-407E-A947-70E740481C1C}">
-                <a14:useLocalDpi xmlns:a14="http://schemas.microsoft.com/office/drawing/2010/main" val="0"/>
-              </a:ext>
-            </a:extLst>
-          </a:blip>
-          <a:srcRect/>
-          <a:stretch>
-            <a:fillRect/>
-          </a:stretch>
-        </p:blipFill>
-        <p:spPr bwMode="auto">
-          <a:xfrm>
-            <a:off x="4033974" y="1825914"/>
-            <a:ext cx="755212" cy="755212"/>
-          </a:xfrm>
-          <a:prstGeom prst="rect">
-            <a:avLst/>
-          </a:prstGeom>
-          <a:noFill/>
-          <a:extLst>
-            <a:ext uri="{909E8E84-426E-40DD-AFC4-6F175D3DCCD1}">
-              <a14:hiddenFill xmlns:a14="http://schemas.microsoft.com/office/drawing/2010/main">
-                <a:solidFill>
-                  <a:srgbClr val="FFFFFF"/>
-                </a:solidFill>
-              </a14:hiddenFill>
-            </a:ext>
-          </a:extLst>
-        </p:spPr>
-      </p:pic>
-      <p:pic>
-        <p:nvPicPr>
           <p:cNvPr id="51" name="Imagem 50" descr="Forma, Círculo&#10;&#10;Descrição gerada automaticamente">
             <a:extLst>
               <a:ext uri="{FF2B5EF4-FFF2-40B4-BE49-F238E27FC236}">
@@ -4508,7 +4368,7 @@
           <p:nvPr/>
         </p:nvPicPr>
         <p:blipFill>
-          <a:blip r:embed="rId11">
+          <a:blip r:embed="rId10">
             <a:extLst>
               <a:ext uri="{28A0092B-C50C-407E-A947-70E740481C1C}">
                 <a14:useLocalDpi xmlns:a14="http://schemas.microsoft.com/office/drawing/2010/main" val="0"/>
@@ -4594,7 +4454,7 @@
         </p:nvCxnSpPr>
         <p:spPr>
           <a:xfrm>
-            <a:off x="8615806" y="3194673"/>
+            <a:off x="8543500" y="3195816"/>
             <a:ext cx="0" cy="778767"/>
           </a:xfrm>
           <a:prstGeom prst="straightConnector1">
@@ -4634,7 +4494,7 @@
           <p:nvPr/>
         </p:nvPicPr>
         <p:blipFill>
-          <a:blip r:embed="rId12">
+          <a:blip r:embed="rId11">
             <a:extLst>
               <a:ext uri="{28A0092B-C50C-407E-A947-70E740481C1C}">
                 <a14:useLocalDpi xmlns:a14="http://schemas.microsoft.com/office/drawing/2010/main" val="0"/>
@@ -4705,7 +4565,7 @@
           <p:nvPr/>
         </p:nvPicPr>
         <p:blipFill>
-          <a:blip r:embed="rId13">
+          <a:blip r:embed="rId12">
             <a:extLst>
               <a:ext uri="{28A0092B-C50C-407E-A947-70E740481C1C}">
                 <a14:useLocalDpi xmlns:a14="http://schemas.microsoft.com/office/drawing/2010/main" val="0"/>
@@ -4718,7 +4578,7 @@
         </p:blipFill>
         <p:spPr>
           <a:xfrm>
-            <a:off x="9945619" y="3648585"/>
+            <a:off x="785239" y="3701357"/>
             <a:ext cx="668991" cy="668991"/>
           </a:xfrm>
           <a:prstGeom prst="rect">
@@ -4741,7 +4601,7 @@
           <p:nvPr/>
         </p:nvPicPr>
         <p:blipFill>
-          <a:blip r:embed="rId14">
+          <a:blip r:embed="rId13">
             <a:extLst>
               <a:ext uri="{28A0092B-C50C-407E-A947-70E740481C1C}">
                 <a14:useLocalDpi xmlns:a14="http://schemas.microsoft.com/office/drawing/2010/main" val="0"/>
@@ -4754,7 +4614,7 @@
         </p:blipFill>
         <p:spPr>
           <a:xfrm>
-            <a:off x="6573154" y="3412986"/>
+            <a:off x="9764802" y="4213627"/>
             <a:ext cx="1067392" cy="1067392"/>
           </a:xfrm>
           <a:prstGeom prst="rect">
@@ -4777,7 +4637,7 @@
           <p:nvPr/>
         </p:nvPicPr>
         <p:blipFill>
-          <a:blip r:embed="rId15">
+          <a:blip r:embed="rId14">
             <a:extLst>
               <a:ext uri="{28A0092B-C50C-407E-A947-70E740481C1C}">
                 <a14:useLocalDpi xmlns:a14="http://schemas.microsoft.com/office/drawing/2010/main" val="0"/>
@@ -4813,7 +4673,7 @@
           <p:nvPr/>
         </p:nvPicPr>
         <p:blipFill>
-          <a:blip r:embed="rId16">
+          <a:blip r:embed="rId15">
             <a:extLst>
               <a:ext uri="{28A0092B-C50C-407E-A947-70E740481C1C}">
                 <a14:useLocalDpi xmlns:a14="http://schemas.microsoft.com/office/drawing/2010/main" val="0"/>
@@ -4826,7 +4686,7 @@
         </p:blipFill>
         <p:spPr>
           <a:xfrm>
-            <a:off x="7404654" y="4327304"/>
+            <a:off x="7408547" y="4327490"/>
             <a:ext cx="1404924" cy="1404924"/>
           </a:xfrm>
           <a:prstGeom prst="rect">
@@ -4849,9 +4709,9 @@
           <p:nvPr/>
         </p:nvCxnSpPr>
         <p:spPr>
-          <a:xfrm flipH="1" flipV="1">
-            <a:off x="2724621" y="2834489"/>
-            <a:ext cx="463228" cy="1075921"/>
+          <a:xfrm flipV="1">
+            <a:off x="2824790" y="2820975"/>
+            <a:ext cx="0" cy="1106818"/>
           </a:xfrm>
           <a:prstGeom prst="straightConnector1">
             <a:avLst/>
@@ -4922,10 +4782,1668 @@
           </a:p>
         </p:txBody>
       </p:sp>
+      <p:sp>
+        <p:nvSpPr>
+          <p:cNvPr id="31" name="CaixaDeTexto 30">
+            <a:extLst>
+              <a:ext uri="{FF2B5EF4-FFF2-40B4-BE49-F238E27FC236}">
+                <a16:creationId xmlns:a16="http://schemas.microsoft.com/office/drawing/2014/main" id="{803C403F-358C-4F60-920E-6D44EADD1FA6}"/>
+              </a:ext>
+            </a:extLst>
+          </p:cNvPr>
+          <p:cNvSpPr txBox="1"/>
+          <p:nvPr/>
+        </p:nvSpPr>
+        <p:spPr>
+          <a:xfrm>
+            <a:off x="5349492" y="4091802"/>
+            <a:ext cx="1736035" cy="1200329"/>
+          </a:xfrm>
+          <a:prstGeom prst="rect">
+            <a:avLst/>
+          </a:prstGeom>
+          <a:noFill/>
+        </p:spPr>
+        <p:txBody>
+          <a:bodyPr wrap="square" rtlCol="0">
+            <a:spAutoFit/>
+          </a:bodyPr>
+          <a:lstStyle/>
+          <a:p>
+            <a:r>
+              <a:rPr lang="pt-BR" dirty="0"/>
+              <a:t>Os analistas acessam o dashboard com os dados </a:t>
+            </a:r>
+          </a:p>
+        </p:txBody>
+      </p:sp>
     </p:spTree>
     <p:extLst>
       <p:ext uri="{BB962C8B-B14F-4D97-AF65-F5344CB8AC3E}">
         <p14:creationId xmlns:p14="http://schemas.microsoft.com/office/powerpoint/2010/main" val="258510461"/>
+      </p:ext>
+    </p:extLst>
+  </p:cSld>
+  <p:clrMapOvr>
+    <a:masterClrMapping/>
+  </p:clrMapOvr>
+</p:sld>
+</file>
+
+<file path=ppt/slides/slide2.xml><?xml version="1.0" encoding="utf-8"?>
+<p:sld xmlns:a="http://schemas.openxmlformats.org/drawingml/2006/main" xmlns:r="http://schemas.openxmlformats.org/officeDocument/2006/relationships" xmlns:p="http://schemas.openxmlformats.org/presentationml/2006/main">
+  <p:cSld>
+    <p:spTree>
+      <p:nvGrpSpPr>
+        <p:cNvPr id="1" name=""/>
+        <p:cNvGrpSpPr/>
+        <p:nvPr/>
+      </p:nvGrpSpPr>
+      <p:grpSpPr>
+        <a:xfrm>
+          <a:off x="0" y="0"/>
+          <a:ext cx="0" cy="0"/>
+          <a:chOff x="0" y="0"/>
+          <a:chExt cx="0" cy="0"/>
+        </a:xfrm>
+      </p:grpSpPr>
+      <p:sp>
+        <p:nvSpPr>
+          <p:cNvPr id="30" name="Retângulo: Cantos Arredondados 29">
+            <a:extLst>
+              <a:ext uri="{FF2B5EF4-FFF2-40B4-BE49-F238E27FC236}">
+                <a16:creationId xmlns:a16="http://schemas.microsoft.com/office/drawing/2014/main" id="{88BB8EA3-6D57-4D17-9AB8-759FAEEEE713}"/>
+              </a:ext>
+            </a:extLst>
+          </p:cNvPr>
+          <p:cNvSpPr/>
+          <p:nvPr/>
+        </p:nvSpPr>
+        <p:spPr>
+          <a:xfrm>
+            <a:off x="317426" y="1650622"/>
+            <a:ext cx="3458818" cy="2160104"/>
+          </a:xfrm>
+          <a:prstGeom prst="roundRect">
+            <a:avLst/>
+          </a:prstGeom>
+          <a:noFill/>
+        </p:spPr>
+        <p:style>
+          <a:lnRef idx="2">
+            <a:schemeClr val="accent1">
+              <a:shade val="50000"/>
+            </a:schemeClr>
+          </a:lnRef>
+          <a:fillRef idx="1">
+            <a:schemeClr val="accent1"/>
+          </a:fillRef>
+          <a:effectRef idx="0">
+            <a:schemeClr val="accent1"/>
+          </a:effectRef>
+          <a:fontRef idx="minor">
+            <a:schemeClr val="lt1"/>
+          </a:fontRef>
+        </p:style>
+        <p:txBody>
+          <a:bodyPr rtlCol="0" anchor="ctr"/>
+          <a:lstStyle/>
+          <a:p>
+            <a:pPr algn="ctr"/>
+            <a:endParaRPr lang="pt-BR"/>
+          </a:p>
+        </p:txBody>
+      </p:sp>
+      <p:sp>
+        <p:nvSpPr>
+          <p:cNvPr id="31" name="CaixaDeTexto 30">
+            <a:extLst>
+              <a:ext uri="{FF2B5EF4-FFF2-40B4-BE49-F238E27FC236}">
+                <a16:creationId xmlns:a16="http://schemas.microsoft.com/office/drawing/2014/main" id="{BE176135-283F-4509-8AF3-5149321E716A}"/>
+              </a:ext>
+            </a:extLst>
+          </p:cNvPr>
+          <p:cNvSpPr txBox="1"/>
+          <p:nvPr/>
+        </p:nvSpPr>
+        <p:spPr>
+          <a:xfrm>
+            <a:off x="1591346" y="1313380"/>
+            <a:ext cx="950847" cy="369332"/>
+          </a:xfrm>
+          <a:prstGeom prst="rect">
+            <a:avLst/>
+          </a:prstGeom>
+          <a:noFill/>
+        </p:spPr>
+        <p:txBody>
+          <a:bodyPr wrap="square" rtlCol="0">
+            <a:spAutoFit/>
+          </a:bodyPr>
+          <a:lstStyle/>
+          <a:p>
+            <a:r>
+              <a:rPr lang="pt-BR" dirty="0"/>
+              <a:t>Estação</a:t>
+            </a:r>
+          </a:p>
+        </p:txBody>
+      </p:sp>
+      <p:pic>
+        <p:nvPicPr>
+          <p:cNvPr id="32" name="Imagem 31" descr="Uma imagem contendo Forma&#10;&#10;Descrição gerada automaticamente">
+            <a:extLst>
+              <a:ext uri="{FF2B5EF4-FFF2-40B4-BE49-F238E27FC236}">
+                <a16:creationId xmlns:a16="http://schemas.microsoft.com/office/drawing/2014/main" id="{21E664BD-1FC2-4643-8BF5-DA26FF0E9C0C}"/>
+              </a:ext>
+            </a:extLst>
+          </p:cNvPr>
+          <p:cNvPicPr>
+            <a:picLocks noChangeAspect="1"/>
+          </p:cNvPicPr>
+          <p:nvPr/>
+        </p:nvPicPr>
+        <p:blipFill>
+          <a:blip r:embed="rId2">
+            <a:extLst>
+              <a:ext uri="{28A0092B-C50C-407E-A947-70E740481C1C}">
+                <a14:useLocalDpi xmlns:a14="http://schemas.microsoft.com/office/drawing/2010/main" val="0"/>
+              </a:ext>
+            </a:extLst>
+          </a:blip>
+          <a:stretch>
+            <a:fillRect/>
+          </a:stretch>
+        </p:blipFill>
+        <p:spPr>
+          <a:xfrm>
+            <a:off x="83294" y="1187552"/>
+            <a:ext cx="668991" cy="668991"/>
+          </a:xfrm>
+          <a:prstGeom prst="rect">
+            <a:avLst/>
+          </a:prstGeom>
+        </p:spPr>
+      </p:pic>
+      <p:pic>
+        <p:nvPicPr>
+          <p:cNvPr id="33" name="Imagem 32" descr="Uma imagem contendo Forma&#10;&#10;Descrição gerada automaticamente">
+            <a:extLst>
+              <a:ext uri="{FF2B5EF4-FFF2-40B4-BE49-F238E27FC236}">
+                <a16:creationId xmlns:a16="http://schemas.microsoft.com/office/drawing/2014/main" id="{01507161-525C-4BC7-9421-294B0808BAA1}"/>
+              </a:ext>
+            </a:extLst>
+          </p:cNvPr>
+          <p:cNvPicPr>
+            <a:picLocks noChangeAspect="1"/>
+          </p:cNvPicPr>
+          <p:nvPr/>
+        </p:nvPicPr>
+        <p:blipFill>
+          <a:blip r:embed="rId3">
+            <a:extLst>
+              <a:ext uri="{28A0092B-C50C-407E-A947-70E740481C1C}">
+                <a14:useLocalDpi xmlns:a14="http://schemas.microsoft.com/office/drawing/2010/main" val="0"/>
+              </a:ext>
+            </a:extLst>
+          </a:blip>
+          <a:stretch>
+            <a:fillRect/>
+          </a:stretch>
+        </p:blipFill>
+        <p:spPr>
+          <a:xfrm>
+            <a:off x="2844031" y="2283162"/>
+            <a:ext cx="819209" cy="819209"/>
+          </a:xfrm>
+          <a:prstGeom prst="rect">
+            <a:avLst/>
+          </a:prstGeom>
+        </p:spPr>
+      </p:pic>
+      <p:pic>
+        <p:nvPicPr>
+          <p:cNvPr id="34" name="Imagem 33" descr="Logotipo&#10;&#10;Descrição gerada automaticamente">
+            <a:extLst>
+              <a:ext uri="{FF2B5EF4-FFF2-40B4-BE49-F238E27FC236}">
+                <a16:creationId xmlns:a16="http://schemas.microsoft.com/office/drawing/2014/main" id="{737E7D2E-D807-4E74-AFD9-6E89C9233D00}"/>
+              </a:ext>
+            </a:extLst>
+          </p:cNvPr>
+          <p:cNvPicPr>
+            <a:picLocks noChangeAspect="1"/>
+          </p:cNvPicPr>
+          <p:nvPr/>
+        </p:nvPicPr>
+        <p:blipFill>
+          <a:blip r:embed="rId4">
+            <a:extLst>
+              <a:ext uri="{28A0092B-C50C-407E-A947-70E740481C1C}">
+                <a14:useLocalDpi xmlns:a14="http://schemas.microsoft.com/office/drawing/2010/main" val="0"/>
+              </a:ext>
+            </a:extLst>
+          </a:blip>
+          <a:stretch>
+            <a:fillRect/>
+          </a:stretch>
+        </p:blipFill>
+        <p:spPr>
+          <a:xfrm>
+            <a:off x="2086592" y="2607577"/>
+            <a:ext cx="819210" cy="819210"/>
+          </a:xfrm>
+          <a:prstGeom prst="rect">
+            <a:avLst/>
+          </a:prstGeom>
+        </p:spPr>
+      </p:pic>
+      <p:cxnSp>
+        <p:nvCxnSpPr>
+          <p:cNvPr id="35" name="Conector reto 34">
+            <a:extLst>
+              <a:ext uri="{FF2B5EF4-FFF2-40B4-BE49-F238E27FC236}">
+                <a16:creationId xmlns:a16="http://schemas.microsoft.com/office/drawing/2014/main" id="{9B55EC8E-4E2B-4027-B647-59A1989D94C0}"/>
+              </a:ext>
+            </a:extLst>
+          </p:cNvPr>
+          <p:cNvCxnSpPr/>
+          <p:nvPr/>
+        </p:nvCxnSpPr>
+        <p:spPr>
+          <a:xfrm>
+            <a:off x="2046835" y="1787599"/>
+            <a:ext cx="0" cy="1810336"/>
+          </a:xfrm>
+          <a:prstGeom prst="line">
+            <a:avLst/>
+          </a:prstGeom>
+        </p:spPr>
+        <p:style>
+          <a:lnRef idx="1">
+            <a:schemeClr val="accent1"/>
+          </a:lnRef>
+          <a:fillRef idx="0">
+            <a:schemeClr val="accent1"/>
+          </a:fillRef>
+          <a:effectRef idx="0">
+            <a:schemeClr val="accent1"/>
+          </a:effectRef>
+          <a:fontRef idx="minor">
+            <a:schemeClr val="tx1"/>
+          </a:fontRef>
+        </p:style>
+      </p:cxnSp>
+      <p:pic>
+        <p:nvPicPr>
+          <p:cNvPr id="36" name="Imagem 35" descr="Uma imagem contendo Forma&#10;&#10;Descrição gerada automaticamente">
+            <a:extLst>
+              <a:ext uri="{FF2B5EF4-FFF2-40B4-BE49-F238E27FC236}">
+                <a16:creationId xmlns:a16="http://schemas.microsoft.com/office/drawing/2014/main" id="{93A3D25A-4CE7-46E5-964A-DDF68BB68430}"/>
+              </a:ext>
+            </a:extLst>
+          </p:cNvPr>
+          <p:cNvPicPr>
+            <a:picLocks noChangeAspect="1"/>
+          </p:cNvPicPr>
+          <p:nvPr/>
+        </p:nvPicPr>
+        <p:blipFill>
+          <a:blip r:embed="rId5">
+            <a:extLst>
+              <a:ext uri="{28A0092B-C50C-407E-A947-70E740481C1C}">
+                <a14:useLocalDpi xmlns:a14="http://schemas.microsoft.com/office/drawing/2010/main" val="0"/>
+              </a:ext>
+            </a:extLst>
+          </a:blip>
+          <a:stretch>
+            <a:fillRect/>
+          </a:stretch>
+        </p:blipFill>
+        <p:spPr>
+          <a:xfrm>
+            <a:off x="528549" y="2029620"/>
+            <a:ext cx="1404924" cy="1404924"/>
+          </a:xfrm>
+          <a:prstGeom prst="rect">
+            <a:avLst/>
+          </a:prstGeom>
+        </p:spPr>
+      </p:pic>
+      <p:sp>
+        <p:nvSpPr>
+          <p:cNvPr id="37" name="Retângulo: Cantos Arredondados 36">
+            <a:extLst>
+              <a:ext uri="{FF2B5EF4-FFF2-40B4-BE49-F238E27FC236}">
+                <a16:creationId xmlns:a16="http://schemas.microsoft.com/office/drawing/2014/main" id="{E763C568-45BF-4B31-AF22-D0286557DE74}"/>
+              </a:ext>
+            </a:extLst>
+          </p:cNvPr>
+          <p:cNvSpPr/>
+          <p:nvPr/>
+        </p:nvSpPr>
+        <p:spPr>
+          <a:xfrm>
+            <a:off x="2152744" y="2016368"/>
+            <a:ext cx="1473831" cy="1581567"/>
+          </a:xfrm>
+          <a:prstGeom prst="roundRect">
+            <a:avLst/>
+          </a:prstGeom>
+          <a:noFill/>
+        </p:spPr>
+        <p:style>
+          <a:lnRef idx="2">
+            <a:schemeClr val="accent1">
+              <a:shade val="50000"/>
+            </a:schemeClr>
+          </a:lnRef>
+          <a:fillRef idx="1">
+            <a:schemeClr val="accent1"/>
+          </a:fillRef>
+          <a:effectRef idx="0">
+            <a:schemeClr val="accent1"/>
+          </a:effectRef>
+          <a:fontRef idx="minor">
+            <a:schemeClr val="lt1"/>
+          </a:fontRef>
+        </p:style>
+        <p:txBody>
+          <a:bodyPr rtlCol="0" anchor="ctr"/>
+          <a:lstStyle/>
+          <a:p>
+            <a:pPr algn="ctr"/>
+            <a:endParaRPr lang="pt-BR"/>
+          </a:p>
+        </p:txBody>
+      </p:sp>
+      <p:sp>
+        <p:nvSpPr>
+          <p:cNvPr id="38" name="Retângulo: Cantos Arredondados 37">
+            <a:extLst>
+              <a:ext uri="{FF2B5EF4-FFF2-40B4-BE49-F238E27FC236}">
+                <a16:creationId xmlns:a16="http://schemas.microsoft.com/office/drawing/2014/main" id="{BEF31BDE-D2E5-4CE8-8CFE-B7918F2D59FB}"/>
+              </a:ext>
+            </a:extLst>
+          </p:cNvPr>
+          <p:cNvSpPr/>
+          <p:nvPr/>
+        </p:nvSpPr>
+        <p:spPr>
+          <a:xfrm>
+            <a:off x="459019" y="2029620"/>
+            <a:ext cx="1503974" cy="1568315"/>
+          </a:xfrm>
+          <a:prstGeom prst="roundRect">
+            <a:avLst/>
+          </a:prstGeom>
+          <a:noFill/>
+        </p:spPr>
+        <p:style>
+          <a:lnRef idx="2">
+            <a:schemeClr val="accent1">
+              <a:shade val="50000"/>
+            </a:schemeClr>
+          </a:lnRef>
+          <a:fillRef idx="1">
+            <a:schemeClr val="accent1"/>
+          </a:fillRef>
+          <a:effectRef idx="0">
+            <a:schemeClr val="accent1"/>
+          </a:effectRef>
+          <a:fontRef idx="minor">
+            <a:schemeClr val="lt1"/>
+          </a:fontRef>
+        </p:style>
+        <p:txBody>
+          <a:bodyPr rtlCol="0" anchor="ctr"/>
+          <a:lstStyle/>
+          <a:p>
+            <a:pPr algn="ctr"/>
+            <a:endParaRPr lang="pt-BR" dirty="0"/>
+          </a:p>
+        </p:txBody>
+      </p:sp>
+      <p:sp>
+        <p:nvSpPr>
+          <p:cNvPr id="39" name="CaixaDeTexto 38">
+            <a:extLst>
+              <a:ext uri="{FF2B5EF4-FFF2-40B4-BE49-F238E27FC236}">
+                <a16:creationId xmlns:a16="http://schemas.microsoft.com/office/drawing/2014/main" id="{F0036BEA-398D-441A-A379-16BFC0CE0382}"/>
+              </a:ext>
+            </a:extLst>
+          </p:cNvPr>
+          <p:cNvSpPr txBox="1"/>
+          <p:nvPr/>
+        </p:nvSpPr>
+        <p:spPr>
+          <a:xfrm>
+            <a:off x="2086591" y="1704947"/>
+            <a:ext cx="1632332" cy="276999"/>
+          </a:xfrm>
+          <a:prstGeom prst="rect">
+            <a:avLst/>
+          </a:prstGeom>
+          <a:noFill/>
+        </p:spPr>
+        <p:txBody>
+          <a:bodyPr wrap="square" rtlCol="0">
+            <a:spAutoFit/>
+          </a:bodyPr>
+          <a:lstStyle/>
+          <a:p>
+            <a:r>
+              <a:rPr lang="pt-BR" sz="1200" dirty="0"/>
+              <a:t>Terminais Monitorados</a:t>
+            </a:r>
+          </a:p>
+        </p:txBody>
+      </p:sp>
+      <p:sp>
+        <p:nvSpPr>
+          <p:cNvPr id="40" name="CaixaDeTexto 39">
+            <a:extLst>
+              <a:ext uri="{FF2B5EF4-FFF2-40B4-BE49-F238E27FC236}">
+                <a16:creationId xmlns:a16="http://schemas.microsoft.com/office/drawing/2014/main" id="{0109337A-B573-4D36-ABB3-E9A6F14E047E}"/>
+              </a:ext>
+            </a:extLst>
+          </p:cNvPr>
+          <p:cNvSpPr txBox="1"/>
+          <p:nvPr/>
+        </p:nvSpPr>
+        <p:spPr>
+          <a:xfrm>
+            <a:off x="685489" y="1687361"/>
+            <a:ext cx="1401102" cy="276999"/>
+          </a:xfrm>
+          <a:prstGeom prst="rect">
+            <a:avLst/>
+          </a:prstGeom>
+          <a:noFill/>
+        </p:spPr>
+        <p:txBody>
+          <a:bodyPr wrap="square" rtlCol="0">
+            <a:spAutoFit/>
+          </a:bodyPr>
+          <a:lstStyle/>
+          <a:p>
+            <a:r>
+              <a:rPr lang="pt-BR" sz="1200" dirty="0"/>
+              <a:t>Analista da Estação</a:t>
+            </a:r>
+          </a:p>
+        </p:txBody>
+      </p:sp>
+      <p:pic>
+        <p:nvPicPr>
+          <p:cNvPr id="41" name="Imagem 40" descr="Uma imagem contendo Forma&#10;&#10;Descrição gerada automaticamente">
+            <a:extLst>
+              <a:ext uri="{FF2B5EF4-FFF2-40B4-BE49-F238E27FC236}">
+                <a16:creationId xmlns:a16="http://schemas.microsoft.com/office/drawing/2014/main" id="{E3712F6A-2A4E-404F-B096-28077F82DBD0}"/>
+              </a:ext>
+            </a:extLst>
+          </p:cNvPr>
+          <p:cNvPicPr>
+            <a:picLocks noChangeAspect="1"/>
+          </p:cNvPicPr>
+          <p:nvPr/>
+        </p:nvPicPr>
+        <p:blipFill>
+          <a:blip r:embed="rId6">
+            <a:extLst>
+              <a:ext uri="{28A0092B-C50C-407E-A947-70E740481C1C}">
+                <a14:useLocalDpi xmlns:a14="http://schemas.microsoft.com/office/drawing/2010/main" val="0"/>
+              </a:ext>
+            </a:extLst>
+          </a:blip>
+          <a:stretch>
+            <a:fillRect/>
+          </a:stretch>
+        </p:blipFill>
+        <p:spPr>
+          <a:xfrm>
+            <a:off x="2363362" y="2180193"/>
+            <a:ext cx="427384" cy="427384"/>
+          </a:xfrm>
+          <a:prstGeom prst="rect">
+            <a:avLst/>
+          </a:prstGeom>
+        </p:spPr>
+      </p:pic>
+      <p:pic>
+        <p:nvPicPr>
+          <p:cNvPr id="42" name="Imagem 41" descr="Logotipo&#10;&#10;Descrição gerada automaticamente">
+            <a:extLst>
+              <a:ext uri="{FF2B5EF4-FFF2-40B4-BE49-F238E27FC236}">
+                <a16:creationId xmlns:a16="http://schemas.microsoft.com/office/drawing/2014/main" id="{4652E850-BE2F-4F53-B178-B8EE7B654294}"/>
+              </a:ext>
+            </a:extLst>
+          </p:cNvPr>
+          <p:cNvPicPr>
+            <a:picLocks noChangeAspect="1"/>
+          </p:cNvPicPr>
+          <p:nvPr/>
+        </p:nvPicPr>
+        <p:blipFill>
+          <a:blip r:embed="rId7">
+            <a:extLst>
+              <a:ext uri="{28A0092B-C50C-407E-A947-70E740481C1C}">
+                <a14:useLocalDpi xmlns:a14="http://schemas.microsoft.com/office/drawing/2010/main" val="0"/>
+              </a:ext>
+            </a:extLst>
+          </a:blip>
+          <a:stretch>
+            <a:fillRect/>
+          </a:stretch>
+        </p:blipFill>
+        <p:spPr>
+          <a:xfrm>
+            <a:off x="1026586" y="2442716"/>
+            <a:ext cx="352969" cy="364435"/>
+          </a:xfrm>
+          <a:prstGeom prst="rect">
+            <a:avLst/>
+          </a:prstGeom>
+        </p:spPr>
+      </p:pic>
+      <p:pic>
+        <p:nvPicPr>
+          <p:cNvPr id="43" name="Imagem 42" descr="Logotipo, Ícone&#10;&#10;Descrição gerada automaticamente">
+            <a:extLst>
+              <a:ext uri="{FF2B5EF4-FFF2-40B4-BE49-F238E27FC236}">
+                <a16:creationId xmlns:a16="http://schemas.microsoft.com/office/drawing/2014/main" id="{8DFDC25D-7C4C-44C5-9846-1EF6FE989B36}"/>
+              </a:ext>
+            </a:extLst>
+          </p:cNvPr>
+          <p:cNvPicPr>
+            <a:picLocks noChangeAspect="1"/>
+          </p:cNvPicPr>
+          <p:nvPr/>
+        </p:nvPicPr>
+        <p:blipFill>
+          <a:blip r:embed="rId8">
+            <a:extLst>
+              <a:ext uri="{28A0092B-C50C-407E-A947-70E740481C1C}">
+                <a14:useLocalDpi xmlns:a14="http://schemas.microsoft.com/office/drawing/2010/main" val="0"/>
+              </a:ext>
+            </a:extLst>
+          </a:blip>
+          <a:stretch>
+            <a:fillRect/>
+          </a:stretch>
+        </p:blipFill>
+        <p:spPr>
+          <a:xfrm>
+            <a:off x="1461204" y="2486027"/>
+            <a:ext cx="344558" cy="344558"/>
+          </a:xfrm>
+          <a:prstGeom prst="rect">
+            <a:avLst/>
+          </a:prstGeom>
+        </p:spPr>
+      </p:pic>
+      <p:pic>
+        <p:nvPicPr>
+          <p:cNvPr id="44" name="Imagem 43" descr="Ícone&#10;&#10;Descrição gerada automaticamente">
+            <a:extLst>
+              <a:ext uri="{FF2B5EF4-FFF2-40B4-BE49-F238E27FC236}">
+                <a16:creationId xmlns:a16="http://schemas.microsoft.com/office/drawing/2014/main" id="{E2F1E2E9-25F5-452C-96F5-3CCD1161D091}"/>
+              </a:ext>
+            </a:extLst>
+          </p:cNvPr>
+          <p:cNvPicPr>
+            <a:picLocks noChangeAspect="1"/>
+          </p:cNvPicPr>
+          <p:nvPr/>
+        </p:nvPicPr>
+        <p:blipFill>
+          <a:blip r:embed="rId9">
+            <a:extLst>
+              <a:ext uri="{28A0092B-C50C-407E-A947-70E740481C1C}">
+                <a14:useLocalDpi xmlns:a14="http://schemas.microsoft.com/office/drawing/2010/main" val="0"/>
+              </a:ext>
+            </a:extLst>
+          </a:blip>
+          <a:stretch>
+            <a:fillRect/>
+          </a:stretch>
+        </p:blipFill>
+        <p:spPr>
+          <a:xfrm>
+            <a:off x="1233899" y="2770431"/>
+            <a:ext cx="301487" cy="301487"/>
+          </a:xfrm>
+          <a:prstGeom prst="rect">
+            <a:avLst/>
+          </a:prstGeom>
+        </p:spPr>
+      </p:pic>
+      <p:sp>
+        <p:nvSpPr>
+          <p:cNvPr id="45" name="Retângulo: Cantos Arredondados 44">
+            <a:extLst>
+              <a:ext uri="{FF2B5EF4-FFF2-40B4-BE49-F238E27FC236}">
+                <a16:creationId xmlns:a16="http://schemas.microsoft.com/office/drawing/2014/main" id="{8EDF9766-6354-4450-8382-A1A5CB0212DB}"/>
+              </a:ext>
+            </a:extLst>
+          </p:cNvPr>
+          <p:cNvSpPr/>
+          <p:nvPr/>
+        </p:nvSpPr>
+        <p:spPr>
+          <a:xfrm>
+            <a:off x="4201921" y="4403988"/>
+            <a:ext cx="3393438" cy="2020262"/>
+          </a:xfrm>
+          <a:prstGeom prst="roundRect">
+            <a:avLst/>
+          </a:prstGeom>
+          <a:noFill/>
+        </p:spPr>
+        <p:style>
+          <a:lnRef idx="2">
+            <a:schemeClr val="accent1">
+              <a:shade val="50000"/>
+            </a:schemeClr>
+          </a:lnRef>
+          <a:fillRef idx="1">
+            <a:schemeClr val="accent1"/>
+          </a:fillRef>
+          <a:effectRef idx="0">
+            <a:schemeClr val="accent1"/>
+          </a:effectRef>
+          <a:fontRef idx="minor">
+            <a:schemeClr val="lt1"/>
+          </a:fontRef>
+        </p:style>
+        <p:txBody>
+          <a:bodyPr rtlCol="0" anchor="ctr"/>
+          <a:lstStyle/>
+          <a:p>
+            <a:pPr algn="ctr"/>
+            <a:endParaRPr lang="pt-BR"/>
+          </a:p>
+        </p:txBody>
+      </p:sp>
+      <p:sp>
+        <p:nvSpPr>
+          <p:cNvPr id="46" name="CaixaDeTexto 45">
+            <a:extLst>
+              <a:ext uri="{FF2B5EF4-FFF2-40B4-BE49-F238E27FC236}">
+                <a16:creationId xmlns:a16="http://schemas.microsoft.com/office/drawing/2014/main" id="{D99A4056-7F6B-492F-9AAB-ABD20C45B829}"/>
+              </a:ext>
+            </a:extLst>
+          </p:cNvPr>
+          <p:cNvSpPr txBox="1"/>
+          <p:nvPr/>
+        </p:nvSpPr>
+        <p:spPr>
+          <a:xfrm>
+            <a:off x="5001053" y="4089596"/>
+            <a:ext cx="1774003" cy="369332"/>
+          </a:xfrm>
+          <a:prstGeom prst="rect">
+            <a:avLst/>
+          </a:prstGeom>
+          <a:noFill/>
+        </p:spPr>
+        <p:txBody>
+          <a:bodyPr wrap="square" rtlCol="0">
+            <a:spAutoFit/>
+          </a:bodyPr>
+          <a:lstStyle/>
+          <a:p>
+            <a:r>
+              <a:rPr lang="pt-BR" dirty="0"/>
+              <a:t>Microsoft Azure</a:t>
+            </a:r>
+          </a:p>
+        </p:txBody>
+      </p:sp>
+      <p:pic>
+        <p:nvPicPr>
+          <p:cNvPr id="47" name="Imagem 46" descr="Logotipo&#10;&#10;Descrição gerada automaticamente">
+            <a:extLst>
+              <a:ext uri="{FF2B5EF4-FFF2-40B4-BE49-F238E27FC236}">
+                <a16:creationId xmlns:a16="http://schemas.microsoft.com/office/drawing/2014/main" id="{F97F6B65-A07D-4EFF-A9EE-F7A72E838B81}"/>
+              </a:ext>
+            </a:extLst>
+          </p:cNvPr>
+          <p:cNvPicPr>
+            <a:picLocks noChangeAspect="1"/>
+          </p:cNvPicPr>
+          <p:nvPr/>
+        </p:nvPicPr>
+        <p:blipFill>
+          <a:blip r:embed="rId10">
+            <a:extLst>
+              <a:ext uri="{28A0092B-C50C-407E-A947-70E740481C1C}">
+                <a14:useLocalDpi xmlns:a14="http://schemas.microsoft.com/office/drawing/2010/main" val="0"/>
+              </a:ext>
+            </a:extLst>
+          </a:blip>
+          <a:stretch>
+            <a:fillRect/>
+          </a:stretch>
+        </p:blipFill>
+        <p:spPr>
+          <a:xfrm>
+            <a:off x="5196915" y="4665787"/>
+            <a:ext cx="1382281" cy="1382281"/>
+          </a:xfrm>
+          <a:prstGeom prst="rect">
+            <a:avLst/>
+          </a:prstGeom>
+        </p:spPr>
+      </p:pic>
+      <p:sp>
+        <p:nvSpPr>
+          <p:cNvPr id="49" name="CaixaDeTexto 48">
+            <a:extLst>
+              <a:ext uri="{FF2B5EF4-FFF2-40B4-BE49-F238E27FC236}">
+                <a16:creationId xmlns:a16="http://schemas.microsoft.com/office/drawing/2014/main" id="{E578DAA3-AF16-4A55-84D3-17CE7E758005}"/>
+              </a:ext>
+            </a:extLst>
+          </p:cNvPr>
+          <p:cNvSpPr txBox="1"/>
+          <p:nvPr/>
+        </p:nvSpPr>
+        <p:spPr>
+          <a:xfrm>
+            <a:off x="8952607" y="1361915"/>
+            <a:ext cx="2161845" cy="369332"/>
+          </a:xfrm>
+          <a:prstGeom prst="rect">
+            <a:avLst/>
+          </a:prstGeom>
+          <a:noFill/>
+        </p:spPr>
+        <p:txBody>
+          <a:bodyPr wrap="square" rtlCol="0">
+            <a:spAutoFit/>
+          </a:bodyPr>
+          <a:lstStyle/>
+          <a:p>
+            <a:r>
+              <a:rPr lang="pt-BR" dirty="0"/>
+              <a:t>Passageiro do Metro</a:t>
+            </a:r>
+          </a:p>
+        </p:txBody>
+      </p:sp>
+      <p:pic>
+        <p:nvPicPr>
+          <p:cNvPr id="50" name="Imagem 49" descr="Imagem em preto e branco&#10;&#10;Descrição gerada automaticamente">
+            <a:extLst>
+              <a:ext uri="{FF2B5EF4-FFF2-40B4-BE49-F238E27FC236}">
+                <a16:creationId xmlns:a16="http://schemas.microsoft.com/office/drawing/2014/main" id="{90EAEAE5-3A7E-4E4D-98FE-79522488F44B}"/>
+              </a:ext>
+            </a:extLst>
+          </p:cNvPr>
+          <p:cNvPicPr>
+            <a:picLocks noChangeAspect="1"/>
+          </p:cNvPicPr>
+          <p:nvPr/>
+        </p:nvPicPr>
+        <p:blipFill>
+          <a:blip r:embed="rId11">
+            <a:extLst>
+              <a:ext uri="{28A0092B-C50C-407E-A947-70E740481C1C}">
+                <a14:useLocalDpi xmlns:a14="http://schemas.microsoft.com/office/drawing/2010/main" val="0"/>
+              </a:ext>
+            </a:extLst>
+          </a:blip>
+          <a:stretch>
+            <a:fillRect/>
+          </a:stretch>
+        </p:blipFill>
+        <p:spPr>
+          <a:xfrm>
+            <a:off x="10186472" y="2216956"/>
+            <a:ext cx="1067392" cy="1067392"/>
+          </a:xfrm>
+          <a:prstGeom prst="rect">
+            <a:avLst/>
+          </a:prstGeom>
+        </p:spPr>
+      </p:pic>
+      <p:pic>
+        <p:nvPicPr>
+          <p:cNvPr id="51" name="Imagem 50" descr="Uma imagem contendo Forma&#10;&#10;Descrição gerada automaticamente">
+            <a:extLst>
+              <a:ext uri="{FF2B5EF4-FFF2-40B4-BE49-F238E27FC236}">
+                <a16:creationId xmlns:a16="http://schemas.microsoft.com/office/drawing/2014/main" id="{106D3E00-F0E5-449C-B9C6-866C4951037B}"/>
+              </a:ext>
+            </a:extLst>
+          </p:cNvPr>
+          <p:cNvPicPr>
+            <a:picLocks noChangeAspect="1"/>
+          </p:cNvPicPr>
+          <p:nvPr/>
+        </p:nvPicPr>
+        <p:blipFill>
+          <a:blip r:embed="rId12">
+            <a:extLst>
+              <a:ext uri="{28A0092B-C50C-407E-A947-70E740481C1C}">
+                <a14:useLocalDpi xmlns:a14="http://schemas.microsoft.com/office/drawing/2010/main" val="0"/>
+              </a:ext>
+            </a:extLst>
+          </a:blip>
+          <a:stretch>
+            <a:fillRect/>
+          </a:stretch>
+        </p:blipFill>
+        <p:spPr>
+          <a:xfrm>
+            <a:off x="9067033" y="2271178"/>
+            <a:ext cx="946590" cy="946590"/>
+          </a:xfrm>
+          <a:prstGeom prst="rect">
+            <a:avLst/>
+          </a:prstGeom>
+        </p:spPr>
+      </p:pic>
+      <p:sp>
+        <p:nvSpPr>
+          <p:cNvPr id="53" name="Retângulo: Cantos Arredondados 52">
+            <a:extLst>
+              <a:ext uri="{FF2B5EF4-FFF2-40B4-BE49-F238E27FC236}">
+                <a16:creationId xmlns:a16="http://schemas.microsoft.com/office/drawing/2014/main" id="{F47E04AC-95B2-4FE0-8ACE-E34271CD03E3}"/>
+              </a:ext>
+            </a:extLst>
+          </p:cNvPr>
+          <p:cNvSpPr/>
+          <p:nvPr/>
+        </p:nvSpPr>
+        <p:spPr>
+          <a:xfrm>
+            <a:off x="4482708" y="1847534"/>
+            <a:ext cx="2705145" cy="1888820"/>
+          </a:xfrm>
+          <a:prstGeom prst="roundRect">
+            <a:avLst/>
+          </a:prstGeom>
+          <a:noFill/>
+        </p:spPr>
+        <p:style>
+          <a:lnRef idx="2">
+            <a:schemeClr val="accent1">
+              <a:shade val="50000"/>
+            </a:schemeClr>
+          </a:lnRef>
+          <a:fillRef idx="1">
+            <a:schemeClr val="accent1"/>
+          </a:fillRef>
+          <a:effectRef idx="0">
+            <a:schemeClr val="accent1"/>
+          </a:effectRef>
+          <a:fontRef idx="minor">
+            <a:schemeClr val="lt1"/>
+          </a:fontRef>
+        </p:style>
+        <p:txBody>
+          <a:bodyPr rtlCol="0" anchor="ctr"/>
+          <a:lstStyle/>
+          <a:p>
+            <a:pPr algn="ctr"/>
+            <a:endParaRPr lang="pt-BR"/>
+          </a:p>
+        </p:txBody>
+      </p:sp>
+      <p:sp>
+        <p:nvSpPr>
+          <p:cNvPr id="54" name="CaixaDeTexto 53">
+            <a:extLst>
+              <a:ext uri="{FF2B5EF4-FFF2-40B4-BE49-F238E27FC236}">
+                <a16:creationId xmlns:a16="http://schemas.microsoft.com/office/drawing/2014/main" id="{1C2A384A-9CAF-4715-93F5-60B071712311}"/>
+              </a:ext>
+            </a:extLst>
+          </p:cNvPr>
+          <p:cNvSpPr txBox="1"/>
+          <p:nvPr/>
+        </p:nvSpPr>
+        <p:spPr>
+          <a:xfrm>
+            <a:off x="5624043" y="1378848"/>
+            <a:ext cx="673734" cy="369332"/>
+          </a:xfrm>
+          <a:prstGeom prst="rect">
+            <a:avLst/>
+          </a:prstGeom>
+          <a:noFill/>
+        </p:spPr>
+        <p:txBody>
+          <a:bodyPr wrap="square" rtlCol="0">
+            <a:spAutoFit/>
+          </a:bodyPr>
+          <a:lstStyle/>
+          <a:p>
+            <a:r>
+              <a:rPr lang="pt-BR" dirty="0"/>
+              <a:t>AWS</a:t>
+            </a:r>
+          </a:p>
+        </p:txBody>
+      </p:sp>
+      <p:pic>
+        <p:nvPicPr>
+          <p:cNvPr id="55" name="Imagem 54" descr="Logotipo&#10;&#10;Descrição gerada automaticamente">
+            <a:extLst>
+              <a:ext uri="{FF2B5EF4-FFF2-40B4-BE49-F238E27FC236}">
+                <a16:creationId xmlns:a16="http://schemas.microsoft.com/office/drawing/2014/main" id="{4C6901A9-F5B6-4744-9F21-70F07AD537C6}"/>
+              </a:ext>
+            </a:extLst>
+          </p:cNvPr>
+          <p:cNvPicPr>
+            <a:picLocks noChangeAspect="1"/>
+          </p:cNvPicPr>
+          <p:nvPr/>
+        </p:nvPicPr>
+        <p:blipFill>
+          <a:blip r:embed="rId13">
+            <a:extLst>
+              <a:ext uri="{28A0092B-C50C-407E-A947-70E740481C1C}">
+                <a14:useLocalDpi xmlns:a14="http://schemas.microsoft.com/office/drawing/2010/main" val="0"/>
+              </a:ext>
+            </a:extLst>
+          </a:blip>
+          <a:stretch>
+            <a:fillRect/>
+          </a:stretch>
+        </p:blipFill>
+        <p:spPr>
+          <a:xfrm>
+            <a:off x="4780164" y="2238759"/>
+            <a:ext cx="633686" cy="633686"/>
+          </a:xfrm>
+          <a:prstGeom prst="rect">
+            <a:avLst/>
+          </a:prstGeom>
+        </p:spPr>
+      </p:pic>
+      <p:sp>
+        <p:nvSpPr>
+          <p:cNvPr id="56" name="Retângulo: Cantos Arredondados 55">
+            <a:extLst>
+              <a:ext uri="{FF2B5EF4-FFF2-40B4-BE49-F238E27FC236}">
+                <a16:creationId xmlns:a16="http://schemas.microsoft.com/office/drawing/2014/main" id="{FC7717DA-39C4-40E0-B4D6-4AF72E140B47}"/>
+              </a:ext>
+            </a:extLst>
+          </p:cNvPr>
+          <p:cNvSpPr/>
+          <p:nvPr/>
+        </p:nvSpPr>
+        <p:spPr>
+          <a:xfrm>
+            <a:off x="4750916" y="2118819"/>
+            <a:ext cx="1515958" cy="1556079"/>
+          </a:xfrm>
+          <a:prstGeom prst="roundRect">
+            <a:avLst/>
+          </a:prstGeom>
+          <a:noFill/>
+        </p:spPr>
+        <p:style>
+          <a:lnRef idx="2">
+            <a:schemeClr val="accent1">
+              <a:shade val="50000"/>
+            </a:schemeClr>
+          </a:lnRef>
+          <a:fillRef idx="1">
+            <a:schemeClr val="accent1"/>
+          </a:fillRef>
+          <a:effectRef idx="0">
+            <a:schemeClr val="accent1"/>
+          </a:effectRef>
+          <a:fontRef idx="minor">
+            <a:schemeClr val="lt1"/>
+          </a:fontRef>
+        </p:style>
+        <p:txBody>
+          <a:bodyPr rtlCol="0" anchor="ctr"/>
+          <a:lstStyle/>
+          <a:p>
+            <a:pPr algn="ctr"/>
+            <a:endParaRPr lang="pt-BR"/>
+          </a:p>
+        </p:txBody>
+      </p:sp>
+      <p:pic>
+        <p:nvPicPr>
+          <p:cNvPr id="57" name="Imagem 56" descr="Logotipo, Ícone&#10;&#10;Descrição gerada automaticamente">
+            <a:extLst>
+              <a:ext uri="{FF2B5EF4-FFF2-40B4-BE49-F238E27FC236}">
+                <a16:creationId xmlns:a16="http://schemas.microsoft.com/office/drawing/2014/main" id="{9464B90E-08C2-418A-84B8-D681C5C42542}"/>
+              </a:ext>
+            </a:extLst>
+          </p:cNvPr>
+          <p:cNvPicPr>
+            <a:picLocks noChangeAspect="1"/>
+          </p:cNvPicPr>
+          <p:nvPr/>
+        </p:nvPicPr>
+        <p:blipFill>
+          <a:blip r:embed="rId14">
+            <a:extLst>
+              <a:ext uri="{28A0092B-C50C-407E-A947-70E740481C1C}">
+                <a14:useLocalDpi xmlns:a14="http://schemas.microsoft.com/office/drawing/2010/main" val="0"/>
+              </a:ext>
+            </a:extLst>
+          </a:blip>
+          <a:stretch>
+            <a:fillRect/>
+          </a:stretch>
+        </p:blipFill>
+        <p:spPr>
+          <a:xfrm>
+            <a:off x="5607630" y="2238759"/>
+            <a:ext cx="483315" cy="677743"/>
+          </a:xfrm>
+          <a:prstGeom prst="rect">
+            <a:avLst/>
+          </a:prstGeom>
+        </p:spPr>
+      </p:pic>
+      <p:pic>
+        <p:nvPicPr>
+          <p:cNvPr id="58" name="Imagem 57" descr="Logotipo&#10;&#10;Descrição gerada automaticamente">
+            <a:extLst>
+              <a:ext uri="{FF2B5EF4-FFF2-40B4-BE49-F238E27FC236}">
+                <a16:creationId xmlns:a16="http://schemas.microsoft.com/office/drawing/2014/main" id="{AA2485F9-77F8-49D2-B41D-0FB3E67D5AB8}"/>
+              </a:ext>
+            </a:extLst>
+          </p:cNvPr>
+          <p:cNvPicPr>
+            <a:picLocks noChangeAspect="1"/>
+          </p:cNvPicPr>
+          <p:nvPr/>
+        </p:nvPicPr>
+        <p:blipFill>
+          <a:blip r:embed="rId15">
+            <a:extLst>
+              <a:ext uri="{28A0092B-C50C-407E-A947-70E740481C1C}">
+                <a14:useLocalDpi xmlns:a14="http://schemas.microsoft.com/office/drawing/2010/main" val="0"/>
+              </a:ext>
+            </a:extLst>
+          </a:blip>
+          <a:stretch>
+            <a:fillRect/>
+          </a:stretch>
+        </p:blipFill>
+        <p:spPr>
+          <a:xfrm>
+            <a:off x="4780164" y="2872445"/>
+            <a:ext cx="633686" cy="633686"/>
+          </a:xfrm>
+          <a:prstGeom prst="rect">
+            <a:avLst/>
+          </a:prstGeom>
+        </p:spPr>
+      </p:pic>
+      <p:pic>
+        <p:nvPicPr>
+          <p:cNvPr id="59" name="Imagem 58" descr="Ícone&#10;&#10;Descrição gerada automaticamente">
+            <a:extLst>
+              <a:ext uri="{FF2B5EF4-FFF2-40B4-BE49-F238E27FC236}">
+                <a16:creationId xmlns:a16="http://schemas.microsoft.com/office/drawing/2014/main" id="{3E16EC37-F466-4855-9312-9ED75FC4155C}"/>
+              </a:ext>
+            </a:extLst>
+          </p:cNvPr>
+          <p:cNvPicPr>
+            <a:picLocks noChangeAspect="1"/>
+          </p:cNvPicPr>
+          <p:nvPr/>
+        </p:nvPicPr>
+        <p:blipFill>
+          <a:blip r:embed="rId16">
+            <a:extLst>
+              <a:ext uri="{28A0092B-C50C-407E-A947-70E740481C1C}">
+                <a14:useLocalDpi xmlns:a14="http://schemas.microsoft.com/office/drawing/2010/main" val="0"/>
+              </a:ext>
+            </a:extLst>
+          </a:blip>
+          <a:stretch>
+            <a:fillRect/>
+          </a:stretch>
+        </p:blipFill>
+        <p:spPr>
+          <a:xfrm>
+            <a:off x="5448598" y="3017536"/>
+            <a:ext cx="818275" cy="409138"/>
+          </a:xfrm>
+          <a:prstGeom prst="rect">
+            <a:avLst/>
+          </a:prstGeom>
+        </p:spPr>
+      </p:pic>
+      <p:pic>
+        <p:nvPicPr>
+          <p:cNvPr id="60" name="Imagem 59" descr="Forma, Círculo&#10;&#10;Descrição gerada automaticamente">
+            <a:extLst>
+              <a:ext uri="{FF2B5EF4-FFF2-40B4-BE49-F238E27FC236}">
+                <a16:creationId xmlns:a16="http://schemas.microsoft.com/office/drawing/2014/main" id="{E08A2662-CBE5-4868-AD4E-54C509C053D9}"/>
+              </a:ext>
+            </a:extLst>
+          </p:cNvPr>
+          <p:cNvPicPr>
+            <a:picLocks noChangeAspect="1"/>
+          </p:cNvPicPr>
+          <p:nvPr/>
+        </p:nvPicPr>
+        <p:blipFill>
+          <a:blip r:embed="rId17">
+            <a:extLst>
+              <a:ext uri="{28A0092B-C50C-407E-A947-70E740481C1C}">
+                <a14:useLocalDpi xmlns:a14="http://schemas.microsoft.com/office/drawing/2010/main" val="0"/>
+              </a:ext>
+            </a:extLst>
+          </a:blip>
+          <a:stretch>
+            <a:fillRect/>
+          </a:stretch>
+        </p:blipFill>
+        <p:spPr>
+          <a:xfrm>
+            <a:off x="6460654" y="2212049"/>
+            <a:ext cx="531339" cy="532424"/>
+          </a:xfrm>
+          <a:prstGeom prst="rect">
+            <a:avLst/>
+          </a:prstGeom>
+        </p:spPr>
+      </p:pic>
+      <p:pic>
+        <p:nvPicPr>
+          <p:cNvPr id="61" name="Imagem 60" descr="Logotipo&#10;&#10;Descrição gerada automaticamente">
+            <a:extLst>
+              <a:ext uri="{FF2B5EF4-FFF2-40B4-BE49-F238E27FC236}">
+                <a16:creationId xmlns:a16="http://schemas.microsoft.com/office/drawing/2014/main" id="{AAA46B16-C192-437B-99A6-5F731CAF84CD}"/>
+              </a:ext>
+            </a:extLst>
+          </p:cNvPr>
+          <p:cNvPicPr>
+            <a:picLocks noChangeAspect="1"/>
+          </p:cNvPicPr>
+          <p:nvPr/>
+        </p:nvPicPr>
+        <p:blipFill>
+          <a:blip r:embed="rId4">
+            <a:extLst>
+              <a:ext uri="{28A0092B-C50C-407E-A947-70E740481C1C}">
+                <a14:useLocalDpi xmlns:a14="http://schemas.microsoft.com/office/drawing/2010/main" val="0"/>
+              </a:ext>
+            </a:extLst>
+          </a:blip>
+          <a:stretch>
+            <a:fillRect/>
+          </a:stretch>
+        </p:blipFill>
+        <p:spPr>
+          <a:xfrm>
+            <a:off x="6296122" y="2831089"/>
+            <a:ext cx="843809" cy="843809"/>
+          </a:xfrm>
+          <a:prstGeom prst="rect">
+            <a:avLst/>
+          </a:prstGeom>
+        </p:spPr>
+      </p:pic>
+      <p:sp>
+        <p:nvSpPr>
+          <p:cNvPr id="62" name="CaixaDeTexto 61">
+            <a:extLst>
+              <a:ext uri="{FF2B5EF4-FFF2-40B4-BE49-F238E27FC236}">
+                <a16:creationId xmlns:a16="http://schemas.microsoft.com/office/drawing/2014/main" id="{D1391AF9-C52C-493D-BCEC-554436EF3DFE}"/>
+              </a:ext>
+            </a:extLst>
+          </p:cNvPr>
+          <p:cNvSpPr txBox="1"/>
+          <p:nvPr/>
+        </p:nvSpPr>
+        <p:spPr>
+          <a:xfrm>
+            <a:off x="5476704" y="1798511"/>
+            <a:ext cx="1010601" cy="369332"/>
+          </a:xfrm>
+          <a:prstGeom prst="rect">
+            <a:avLst/>
+          </a:prstGeom>
+          <a:noFill/>
+        </p:spPr>
+        <p:txBody>
+          <a:bodyPr wrap="square" rtlCol="0">
+            <a:spAutoFit/>
+          </a:bodyPr>
+          <a:lstStyle/>
+          <a:p>
+            <a:r>
+              <a:rPr lang="pt-BR" dirty="0"/>
+              <a:t>Instância</a:t>
+            </a:r>
+          </a:p>
+        </p:txBody>
+      </p:sp>
+      <p:sp>
+        <p:nvSpPr>
+          <p:cNvPr id="63" name="Retângulo: Cantos Arredondados 62">
+            <a:extLst>
+              <a:ext uri="{FF2B5EF4-FFF2-40B4-BE49-F238E27FC236}">
+                <a16:creationId xmlns:a16="http://schemas.microsoft.com/office/drawing/2014/main" id="{387CA653-7FF4-4BBD-B29A-235F344EC41F}"/>
+              </a:ext>
+            </a:extLst>
+          </p:cNvPr>
+          <p:cNvSpPr/>
+          <p:nvPr/>
+        </p:nvSpPr>
+        <p:spPr>
+          <a:xfrm>
+            <a:off x="4102463" y="1705976"/>
+            <a:ext cx="3458818" cy="2160104"/>
+          </a:xfrm>
+          <a:prstGeom prst="roundRect">
+            <a:avLst/>
+          </a:prstGeom>
+          <a:noFill/>
+        </p:spPr>
+        <p:style>
+          <a:lnRef idx="2">
+            <a:schemeClr val="accent1">
+              <a:shade val="50000"/>
+            </a:schemeClr>
+          </a:lnRef>
+          <a:fillRef idx="1">
+            <a:schemeClr val="accent1"/>
+          </a:fillRef>
+          <a:effectRef idx="0">
+            <a:schemeClr val="accent1"/>
+          </a:effectRef>
+          <a:fontRef idx="minor">
+            <a:schemeClr val="lt1"/>
+          </a:fontRef>
+        </p:style>
+        <p:txBody>
+          <a:bodyPr rtlCol="0" anchor="ctr"/>
+          <a:lstStyle/>
+          <a:p>
+            <a:pPr algn="ctr"/>
+            <a:endParaRPr lang="pt-BR"/>
+          </a:p>
+        </p:txBody>
+      </p:sp>
+      <p:pic>
+        <p:nvPicPr>
+          <p:cNvPr id="64" name="Imagem 63" descr="Logotipo, nome da empresa&#10;&#10;Descrição gerada automaticamente">
+            <a:extLst>
+              <a:ext uri="{FF2B5EF4-FFF2-40B4-BE49-F238E27FC236}">
+                <a16:creationId xmlns:a16="http://schemas.microsoft.com/office/drawing/2014/main" id="{9432AFCC-0981-4898-937D-05C8FF53021F}"/>
+              </a:ext>
+            </a:extLst>
+          </p:cNvPr>
+          <p:cNvPicPr>
+            <a:picLocks noChangeAspect="1"/>
+          </p:cNvPicPr>
+          <p:nvPr/>
+        </p:nvPicPr>
+        <p:blipFill>
+          <a:blip r:embed="rId18">
+            <a:extLst>
+              <a:ext uri="{28A0092B-C50C-407E-A947-70E740481C1C}">
+                <a14:useLocalDpi xmlns:a14="http://schemas.microsoft.com/office/drawing/2010/main" val="0"/>
+              </a:ext>
+            </a:extLst>
+          </a:blip>
+          <a:stretch>
+            <a:fillRect/>
+          </a:stretch>
+        </p:blipFill>
+        <p:spPr>
+          <a:xfrm>
+            <a:off x="5587236" y="548686"/>
+            <a:ext cx="637250" cy="637250"/>
+          </a:xfrm>
+          <a:prstGeom prst="rect">
+            <a:avLst/>
+          </a:prstGeom>
+        </p:spPr>
+      </p:pic>
+      <p:sp>
+        <p:nvSpPr>
+          <p:cNvPr id="65" name="Retângulo: Cantos Arredondados 64">
+            <a:extLst>
+              <a:ext uri="{FF2B5EF4-FFF2-40B4-BE49-F238E27FC236}">
+                <a16:creationId xmlns:a16="http://schemas.microsoft.com/office/drawing/2014/main" id="{02E2624E-1003-4A84-A727-E58B687BB7B5}"/>
+              </a:ext>
+            </a:extLst>
+          </p:cNvPr>
+          <p:cNvSpPr/>
+          <p:nvPr/>
+        </p:nvSpPr>
+        <p:spPr>
+          <a:xfrm>
+            <a:off x="5423216" y="483574"/>
+            <a:ext cx="950847" cy="767749"/>
+          </a:xfrm>
+          <a:prstGeom prst="roundRect">
+            <a:avLst/>
+          </a:prstGeom>
+          <a:noFill/>
+        </p:spPr>
+        <p:style>
+          <a:lnRef idx="2">
+            <a:schemeClr val="accent1">
+              <a:shade val="50000"/>
+            </a:schemeClr>
+          </a:lnRef>
+          <a:fillRef idx="1">
+            <a:schemeClr val="accent1"/>
+          </a:fillRef>
+          <a:effectRef idx="0">
+            <a:schemeClr val="accent1"/>
+          </a:effectRef>
+          <a:fontRef idx="minor">
+            <a:schemeClr val="lt1"/>
+          </a:fontRef>
+        </p:style>
+        <p:txBody>
+          <a:bodyPr rtlCol="0" anchor="ctr"/>
+          <a:lstStyle/>
+          <a:p>
+            <a:pPr algn="ctr"/>
+            <a:endParaRPr lang="pt-BR"/>
+          </a:p>
+        </p:txBody>
+      </p:sp>
+      <p:sp>
+        <p:nvSpPr>
+          <p:cNvPr id="66" name="CaixaDeTexto 65">
+            <a:extLst>
+              <a:ext uri="{FF2B5EF4-FFF2-40B4-BE49-F238E27FC236}">
+                <a16:creationId xmlns:a16="http://schemas.microsoft.com/office/drawing/2014/main" id="{5962AD0F-91DF-41D6-82AB-46379C11D34B}"/>
+              </a:ext>
+            </a:extLst>
+          </p:cNvPr>
+          <p:cNvSpPr txBox="1"/>
+          <p:nvPr/>
+        </p:nvSpPr>
+        <p:spPr>
+          <a:xfrm>
+            <a:off x="5403930" y="43326"/>
+            <a:ext cx="1081002" cy="369332"/>
+          </a:xfrm>
+          <a:prstGeom prst="rect">
+            <a:avLst/>
+          </a:prstGeom>
+          <a:noFill/>
+        </p:spPr>
+        <p:txBody>
+          <a:bodyPr wrap="square" rtlCol="0">
+            <a:spAutoFit/>
+          </a:bodyPr>
+          <a:lstStyle/>
+          <a:p>
+            <a:r>
+              <a:rPr lang="pt-BR" dirty="0"/>
+              <a:t>API Slack</a:t>
+            </a:r>
+          </a:p>
+        </p:txBody>
+      </p:sp>
+      <p:cxnSp>
+        <p:nvCxnSpPr>
+          <p:cNvPr id="82" name="Conector de Seta Reta 81">
+            <a:extLst>
+              <a:ext uri="{FF2B5EF4-FFF2-40B4-BE49-F238E27FC236}">
+                <a16:creationId xmlns:a16="http://schemas.microsoft.com/office/drawing/2014/main" id="{AFC7BB96-D2C9-47E2-BC33-A3D4BD0D1135}"/>
+              </a:ext>
+            </a:extLst>
+          </p:cNvPr>
+          <p:cNvCxnSpPr>
+            <a:cxnSpLocks/>
+          </p:cNvCxnSpPr>
+          <p:nvPr/>
+        </p:nvCxnSpPr>
+        <p:spPr>
+          <a:xfrm>
+            <a:off x="2645605" y="3907672"/>
+            <a:ext cx="1462498" cy="1251726"/>
+          </a:xfrm>
+          <a:prstGeom prst="straightConnector1">
+            <a:avLst/>
+          </a:prstGeom>
+          <a:ln w="57150">
+            <a:tailEnd type="triangle"/>
+          </a:ln>
+        </p:spPr>
+        <p:style>
+          <a:lnRef idx="1">
+            <a:schemeClr val="accent1"/>
+          </a:lnRef>
+          <a:fillRef idx="0">
+            <a:schemeClr val="accent1"/>
+          </a:fillRef>
+          <a:effectRef idx="0">
+            <a:schemeClr val="accent1"/>
+          </a:effectRef>
+          <a:fontRef idx="minor">
+            <a:schemeClr val="tx1"/>
+          </a:fontRef>
+        </p:style>
+      </p:cxnSp>
+      <p:cxnSp>
+        <p:nvCxnSpPr>
+          <p:cNvPr id="84" name="Conector de Seta Reta 83">
+            <a:extLst>
+              <a:ext uri="{FF2B5EF4-FFF2-40B4-BE49-F238E27FC236}">
+                <a16:creationId xmlns:a16="http://schemas.microsoft.com/office/drawing/2014/main" id="{8A95DE9A-7B6A-4E76-8753-1631AD9BA61E}"/>
+              </a:ext>
+            </a:extLst>
+          </p:cNvPr>
+          <p:cNvCxnSpPr>
+            <a:cxnSpLocks/>
+          </p:cNvCxnSpPr>
+          <p:nvPr/>
+        </p:nvCxnSpPr>
+        <p:spPr>
+          <a:xfrm>
+            <a:off x="3688904" y="2872445"/>
+            <a:ext cx="744463" cy="24413"/>
+          </a:xfrm>
+          <a:prstGeom prst="straightConnector1">
+            <a:avLst/>
+          </a:prstGeom>
+          <a:ln w="57150">
+            <a:tailEnd type="triangle"/>
+          </a:ln>
+        </p:spPr>
+        <p:style>
+          <a:lnRef idx="1">
+            <a:schemeClr val="accent1"/>
+          </a:lnRef>
+          <a:fillRef idx="0">
+            <a:schemeClr val="accent1"/>
+          </a:fillRef>
+          <a:effectRef idx="0">
+            <a:schemeClr val="accent1"/>
+          </a:effectRef>
+          <a:fontRef idx="minor">
+            <a:schemeClr val="tx1"/>
+          </a:fontRef>
+        </p:style>
+      </p:cxnSp>
+      <p:cxnSp>
+        <p:nvCxnSpPr>
+          <p:cNvPr id="87" name="Conector de Seta Reta 86">
+            <a:extLst>
+              <a:ext uri="{FF2B5EF4-FFF2-40B4-BE49-F238E27FC236}">
+                <a16:creationId xmlns:a16="http://schemas.microsoft.com/office/drawing/2014/main" id="{F830D955-4214-4C3D-BC90-C3C28CB239C3}"/>
+              </a:ext>
+            </a:extLst>
+          </p:cNvPr>
+          <p:cNvCxnSpPr>
+            <a:cxnSpLocks/>
+          </p:cNvCxnSpPr>
+          <p:nvPr/>
+        </p:nvCxnSpPr>
+        <p:spPr>
+          <a:xfrm flipH="1">
+            <a:off x="7237194" y="2924358"/>
+            <a:ext cx="1049039" cy="0"/>
+          </a:xfrm>
+          <a:prstGeom prst="straightConnector1">
+            <a:avLst/>
+          </a:prstGeom>
+          <a:ln w="57150">
+            <a:tailEnd type="triangle"/>
+          </a:ln>
+        </p:spPr>
+        <p:style>
+          <a:lnRef idx="1">
+            <a:schemeClr val="accent1"/>
+          </a:lnRef>
+          <a:fillRef idx="0">
+            <a:schemeClr val="accent1"/>
+          </a:fillRef>
+          <a:effectRef idx="0">
+            <a:schemeClr val="accent1"/>
+          </a:effectRef>
+          <a:fontRef idx="minor">
+            <a:schemeClr val="tx1"/>
+          </a:fontRef>
+        </p:style>
+      </p:cxnSp>
+      <p:cxnSp>
+        <p:nvCxnSpPr>
+          <p:cNvPr id="90" name="Conector de Seta Reta 89">
+            <a:extLst>
+              <a:ext uri="{FF2B5EF4-FFF2-40B4-BE49-F238E27FC236}">
+                <a16:creationId xmlns:a16="http://schemas.microsoft.com/office/drawing/2014/main" id="{54CF2114-FB0F-4D8B-9662-907246EBBD71}"/>
+              </a:ext>
+            </a:extLst>
+          </p:cNvPr>
+          <p:cNvCxnSpPr>
+            <a:cxnSpLocks/>
+            <a:endCxn id="65" idx="3"/>
+          </p:cNvCxnSpPr>
+          <p:nvPr/>
+        </p:nvCxnSpPr>
+        <p:spPr>
+          <a:xfrm flipH="1" flipV="1">
+            <a:off x="6374063" y="867449"/>
+            <a:ext cx="473438" cy="845184"/>
+          </a:xfrm>
+          <a:prstGeom prst="straightConnector1">
+            <a:avLst/>
+          </a:prstGeom>
+          <a:ln w="57150">
+            <a:tailEnd type="triangle"/>
+          </a:ln>
+        </p:spPr>
+        <p:style>
+          <a:lnRef idx="1">
+            <a:schemeClr val="accent1"/>
+          </a:lnRef>
+          <a:fillRef idx="0">
+            <a:schemeClr val="accent1"/>
+          </a:fillRef>
+          <a:effectRef idx="0">
+            <a:schemeClr val="accent1"/>
+          </a:effectRef>
+          <a:fontRef idx="minor">
+            <a:schemeClr val="tx1"/>
+          </a:fontRef>
+        </p:style>
+      </p:cxnSp>
+      <p:cxnSp>
+        <p:nvCxnSpPr>
+          <p:cNvPr id="92" name="Conector de Seta Reta 91">
+            <a:extLst>
+              <a:ext uri="{FF2B5EF4-FFF2-40B4-BE49-F238E27FC236}">
+                <a16:creationId xmlns:a16="http://schemas.microsoft.com/office/drawing/2014/main" id="{C0506A0F-8348-4064-AD5C-3EA3642AA677}"/>
+              </a:ext>
+            </a:extLst>
+          </p:cNvPr>
+          <p:cNvCxnSpPr>
+            <a:cxnSpLocks/>
+          </p:cNvCxnSpPr>
+          <p:nvPr/>
+        </p:nvCxnSpPr>
+        <p:spPr>
+          <a:xfrm flipV="1">
+            <a:off x="2990669" y="743846"/>
+            <a:ext cx="2452429" cy="861351"/>
+          </a:xfrm>
+          <a:prstGeom prst="straightConnector1">
+            <a:avLst/>
+          </a:prstGeom>
+          <a:ln w="57150">
+            <a:tailEnd type="triangle"/>
+          </a:ln>
+        </p:spPr>
+        <p:style>
+          <a:lnRef idx="1">
+            <a:schemeClr val="accent1"/>
+          </a:lnRef>
+          <a:fillRef idx="0">
+            <a:schemeClr val="accent1"/>
+          </a:fillRef>
+          <a:effectRef idx="0">
+            <a:schemeClr val="accent1"/>
+          </a:effectRef>
+          <a:fontRef idx="minor">
+            <a:schemeClr val="tx1"/>
+          </a:fontRef>
+        </p:style>
+      </p:cxnSp>
+      <p:sp>
+        <p:nvSpPr>
+          <p:cNvPr id="95" name="Retângulo: Cantos Arredondados 94">
+            <a:extLst>
+              <a:ext uri="{FF2B5EF4-FFF2-40B4-BE49-F238E27FC236}">
+                <a16:creationId xmlns:a16="http://schemas.microsoft.com/office/drawing/2014/main" id="{8BD1C23F-B0E2-42DA-8A18-FE27880455D4}"/>
+              </a:ext>
+            </a:extLst>
+          </p:cNvPr>
+          <p:cNvSpPr/>
+          <p:nvPr/>
+        </p:nvSpPr>
+        <p:spPr>
+          <a:xfrm>
+            <a:off x="8267826" y="1749795"/>
+            <a:ext cx="3393438" cy="2020262"/>
+          </a:xfrm>
+          <a:prstGeom prst="roundRect">
+            <a:avLst/>
+          </a:prstGeom>
+          <a:noFill/>
+        </p:spPr>
+        <p:style>
+          <a:lnRef idx="2">
+            <a:schemeClr val="accent1">
+              <a:shade val="50000"/>
+            </a:schemeClr>
+          </a:lnRef>
+          <a:fillRef idx="1">
+            <a:schemeClr val="accent1"/>
+          </a:fillRef>
+          <a:effectRef idx="0">
+            <a:schemeClr val="accent1"/>
+          </a:effectRef>
+          <a:fontRef idx="minor">
+            <a:schemeClr val="lt1"/>
+          </a:fontRef>
+        </p:style>
+        <p:txBody>
+          <a:bodyPr rtlCol="0" anchor="ctr"/>
+          <a:lstStyle/>
+          <a:p>
+            <a:pPr algn="ctr"/>
+            <a:endParaRPr lang="pt-BR"/>
+          </a:p>
+        </p:txBody>
+      </p:sp>
+    </p:spTree>
+    <p:extLst>
+      <p:ext uri="{BB962C8B-B14F-4D97-AF65-F5344CB8AC3E}">
+        <p14:creationId xmlns:p14="http://schemas.microsoft.com/office/powerpoint/2010/main" val="286682747"/>
       </p:ext>
     </p:extLst>
   </p:cSld>

</xml_diff>